<commit_message>
> Users can now click a waypoint to move it with the mouse.
</commit_message>
<xml_diff>
--- a/documentation/Image Development.pptx
+++ b/documentation/Image Development.pptx
@@ -289,7 +289,7 @@
           <a:p>
             <a:fld id="{35235A8E-C9FF-484A-9A3C-FF18C6594B53}" type="datetimeFigureOut">
               <a:rPr lang="en-US" smtClean="0"/>
-              <a:t>03/11/2021</a:t>
+              <a:t>07/17/2022</a:t>
             </a:fld>
             <a:endParaRPr lang="en-US"/>
           </a:p>
@@ -459,7 +459,7 @@
           <a:p>
             <a:fld id="{35235A8E-C9FF-484A-9A3C-FF18C6594B53}" type="datetimeFigureOut">
               <a:rPr lang="en-US" smtClean="0"/>
-              <a:t>03/11/2021</a:t>
+              <a:t>07/17/2022</a:t>
             </a:fld>
             <a:endParaRPr lang="en-US"/>
           </a:p>
@@ -639,7 +639,7 @@
           <a:p>
             <a:fld id="{35235A8E-C9FF-484A-9A3C-FF18C6594B53}" type="datetimeFigureOut">
               <a:rPr lang="en-US" smtClean="0"/>
-              <a:t>03/11/2021</a:t>
+              <a:t>07/17/2022</a:t>
             </a:fld>
             <a:endParaRPr lang="en-US"/>
           </a:p>
@@ -809,7 +809,7 @@
           <a:p>
             <a:fld id="{35235A8E-C9FF-484A-9A3C-FF18C6594B53}" type="datetimeFigureOut">
               <a:rPr lang="en-US" smtClean="0"/>
-              <a:t>03/11/2021</a:t>
+              <a:t>07/17/2022</a:t>
             </a:fld>
             <a:endParaRPr lang="en-US"/>
           </a:p>
@@ -1055,7 +1055,7 @@
           <a:p>
             <a:fld id="{35235A8E-C9FF-484A-9A3C-FF18C6594B53}" type="datetimeFigureOut">
               <a:rPr lang="en-US" smtClean="0"/>
-              <a:t>03/11/2021</a:t>
+              <a:t>07/17/2022</a:t>
             </a:fld>
             <a:endParaRPr lang="en-US"/>
           </a:p>
@@ -1343,7 +1343,7 @@
           <a:p>
             <a:fld id="{35235A8E-C9FF-484A-9A3C-FF18C6594B53}" type="datetimeFigureOut">
               <a:rPr lang="en-US" smtClean="0"/>
-              <a:t>03/11/2021</a:t>
+              <a:t>07/17/2022</a:t>
             </a:fld>
             <a:endParaRPr lang="en-US"/>
           </a:p>
@@ -1765,7 +1765,7 @@
           <a:p>
             <a:fld id="{35235A8E-C9FF-484A-9A3C-FF18C6594B53}" type="datetimeFigureOut">
               <a:rPr lang="en-US" smtClean="0"/>
-              <a:t>03/11/2021</a:t>
+              <a:t>07/17/2022</a:t>
             </a:fld>
             <a:endParaRPr lang="en-US"/>
           </a:p>
@@ -1883,7 +1883,7 @@
           <a:p>
             <a:fld id="{35235A8E-C9FF-484A-9A3C-FF18C6594B53}" type="datetimeFigureOut">
               <a:rPr lang="en-US" smtClean="0"/>
-              <a:t>03/11/2021</a:t>
+              <a:t>07/17/2022</a:t>
             </a:fld>
             <a:endParaRPr lang="en-US"/>
           </a:p>
@@ -1978,7 +1978,7 @@
           <a:p>
             <a:fld id="{35235A8E-C9FF-484A-9A3C-FF18C6594B53}" type="datetimeFigureOut">
               <a:rPr lang="en-US" smtClean="0"/>
-              <a:t>03/11/2021</a:t>
+              <a:t>07/17/2022</a:t>
             </a:fld>
             <a:endParaRPr lang="en-US"/>
           </a:p>
@@ -2255,7 +2255,7 @@
           <a:p>
             <a:fld id="{35235A8E-C9FF-484A-9A3C-FF18C6594B53}" type="datetimeFigureOut">
               <a:rPr lang="en-US" smtClean="0"/>
-              <a:t>03/11/2021</a:t>
+              <a:t>07/17/2022</a:t>
             </a:fld>
             <a:endParaRPr lang="en-US"/>
           </a:p>
@@ -2508,7 +2508,7 @@
           <a:p>
             <a:fld id="{35235A8E-C9FF-484A-9A3C-FF18C6594B53}" type="datetimeFigureOut">
               <a:rPr lang="en-US" smtClean="0"/>
-              <a:t>03/11/2021</a:t>
+              <a:t>07/17/2022</a:t>
             </a:fld>
             <a:endParaRPr lang="en-US"/>
           </a:p>
@@ -2721,7 +2721,7 @@
           <a:p>
             <a:fld id="{35235A8E-C9FF-484A-9A3C-FF18C6594B53}" type="datetimeFigureOut">
               <a:rPr lang="en-US" smtClean="0"/>
-              <a:t>03/11/2021</a:t>
+              <a:t>07/17/2022</a:t>
             </a:fld>
             <a:endParaRPr lang="en-US"/>
           </a:p>
@@ -3974,6 +3974,107 @@
           </p:txBody>
         </p:sp>
       </p:grpSp>
+      <p:grpSp>
+        <p:nvGrpSpPr>
+          <p:cNvPr id="12" name="Group 11"/>
+          <p:cNvGrpSpPr/>
+          <p:nvPr/>
+        </p:nvGrpSpPr>
+        <p:grpSpPr>
+          <a:xfrm>
+            <a:off x="6248400" y="438912"/>
+            <a:ext cx="1828800" cy="1828800"/>
+            <a:chOff x="6248400" y="438912"/>
+            <a:chExt cx="1828800" cy="1828800"/>
+          </a:xfrm>
+        </p:grpSpPr>
+        <p:sp>
+          <p:nvSpPr>
+            <p:cNvPr id="19" name="Oval 18"/>
+            <p:cNvSpPr/>
+            <p:nvPr/>
+          </p:nvSpPr>
+          <p:spPr>
+            <a:xfrm>
+              <a:off x="6248400" y="438912"/>
+              <a:ext cx="1828800" cy="1828800"/>
+            </a:xfrm>
+            <a:prstGeom prst="ellipse">
+              <a:avLst/>
+            </a:prstGeom>
+            <a:noFill/>
+            <a:ln w="152400">
+              <a:solidFill>
+                <a:schemeClr val="tx1"/>
+              </a:solidFill>
+            </a:ln>
+          </p:spPr>
+          <p:style>
+            <a:lnRef idx="2">
+              <a:schemeClr val="accent1">
+                <a:shade val="50000"/>
+              </a:schemeClr>
+            </a:lnRef>
+            <a:fillRef idx="1">
+              <a:schemeClr val="accent1"/>
+            </a:fillRef>
+            <a:effectRef idx="0">
+              <a:schemeClr val="accent1"/>
+            </a:effectRef>
+            <a:fontRef idx="minor">
+              <a:schemeClr val="lt1"/>
+            </a:fontRef>
+          </p:style>
+          <p:txBody>
+            <a:bodyPr rtlCol="0" anchor="ctr"/>
+            <a:lstStyle/>
+            <a:p>
+              <a:pPr algn="ctr"/>
+              <a:endParaRPr lang="en-US"/>
+            </a:p>
+          </p:txBody>
+        </p:sp>
+        <p:cxnSp>
+          <p:nvCxnSpPr>
+            <p:cNvPr id="11" name="Straight Arrow Connector 10"/>
+            <p:cNvCxnSpPr>
+              <a:stCxn id="19" idx="2"/>
+              <a:endCxn id="19" idx="6"/>
+            </p:cNvCxnSpPr>
+            <p:nvPr/>
+          </p:nvCxnSpPr>
+          <p:spPr>
+            <a:xfrm>
+              <a:off x="6248400" y="1353312"/>
+              <a:ext cx="1828800" cy="0"/>
+            </a:xfrm>
+            <a:prstGeom prst="straightConnector1">
+              <a:avLst/>
+            </a:prstGeom>
+            <a:ln w="279400">
+              <a:solidFill>
+                <a:schemeClr val="tx1"/>
+              </a:solidFill>
+              <a:headEnd type="none" w="med" len="med"/>
+              <a:tailEnd type="triangle" w="med" len="med"/>
+            </a:ln>
+          </p:spPr>
+          <p:style>
+            <a:lnRef idx="1">
+              <a:schemeClr val="accent1"/>
+            </a:lnRef>
+            <a:fillRef idx="0">
+              <a:schemeClr val="accent1"/>
+            </a:fillRef>
+            <a:effectRef idx="0">
+              <a:schemeClr val="accent1"/>
+            </a:effectRef>
+            <a:fontRef idx="minor">
+              <a:schemeClr val="tx1"/>
+            </a:fontRef>
+          </p:style>
+        </p:cxnSp>
+      </p:grpSp>
     </p:spTree>
     <p:extLst>
       <p:ext uri="{BB962C8B-B14F-4D97-AF65-F5344CB8AC3E}">

</xml_diff>